<commit_message>
#1 - Batch 구조 설계
1개의 헬스장 - 다수의 회원 을 기준으로 하여 작성하였음
</commit_message>
<xml_diff>
--- a/document/[Batch 설계] PT 이용 서비스 만들기.pptx
+++ b/document/[Batch 설계] PT 이용 서비스 만들기.pptx
@@ -3345,13 +3345,13 @@
           <p:nvPr>
             <p:extLst>
               <p:ext uri="{D42A27DB-BD31-4B8C-83A1-F6EECF244321}">
-                <p14:modId xmlns:p14="http://schemas.microsoft.com/office/powerpoint/2010/main" val="1492185629"/>
+                <p14:modId xmlns:p14="http://schemas.microsoft.com/office/powerpoint/2010/main" val="1523425355"/>
               </p:ext>
             </p:extLst>
           </p:nvPr>
         </p:nvGraphicFramePr>
         <p:xfrm>
-          <a:off x="8813800" y="2132979"/>
+          <a:off x="8823325" y="2199654"/>
           <a:ext cx="1958975" cy="1981445"/>
         </p:xfrm>
         <a:graphic>
@@ -3514,13 +3514,13 @@
           <p:nvPr>
             <p:extLst>
               <p:ext uri="{D42A27DB-BD31-4B8C-83A1-F6EECF244321}">
-                <p14:modId xmlns:p14="http://schemas.microsoft.com/office/powerpoint/2010/main" val="2757807406"/>
+                <p14:modId xmlns:p14="http://schemas.microsoft.com/office/powerpoint/2010/main" val="3492146002"/>
               </p:ext>
             </p:extLst>
           </p:nvPr>
         </p:nvGraphicFramePr>
         <p:xfrm>
-          <a:off x="1755775" y="2132979"/>
+          <a:off x="1765300" y="2199654"/>
           <a:ext cx="1958975" cy="2774023"/>
         </p:xfrm>
         <a:graphic>
@@ -3743,13 +3743,13 @@
           <p:nvPr>
             <p:extLst>
               <p:ext uri="{D42A27DB-BD31-4B8C-83A1-F6EECF244321}">
-                <p14:modId xmlns:p14="http://schemas.microsoft.com/office/powerpoint/2010/main" val="3960766672"/>
+                <p14:modId xmlns:p14="http://schemas.microsoft.com/office/powerpoint/2010/main" val="1268833330"/>
               </p:ext>
             </p:extLst>
           </p:nvPr>
         </p:nvGraphicFramePr>
         <p:xfrm>
-          <a:off x="4108450" y="2132979"/>
+          <a:off x="4117975" y="2199654"/>
           <a:ext cx="1958975" cy="2774023"/>
         </p:xfrm>
         <a:graphic>
@@ -4004,13 +4004,13 @@
           <p:nvPr>
             <p:extLst>
               <p:ext uri="{D42A27DB-BD31-4B8C-83A1-F6EECF244321}">
-                <p14:modId xmlns:p14="http://schemas.microsoft.com/office/powerpoint/2010/main" val="2264669727"/>
+                <p14:modId xmlns:p14="http://schemas.microsoft.com/office/powerpoint/2010/main" val="3482119543"/>
               </p:ext>
             </p:extLst>
           </p:nvPr>
         </p:nvGraphicFramePr>
         <p:xfrm>
-          <a:off x="6461125" y="2132979"/>
+          <a:off x="6470650" y="2199654"/>
           <a:ext cx="1958975" cy="1981445"/>
         </p:xfrm>
         <a:graphic>

</xml_diff>